<commit_message>
v0.1 - Initialisation of remaining Systems Application Testing Module tasks and documentation.
</commit_message>
<xml_diff>
--- a/istqb 5.pptx
+++ b/istqb 5.pptx
@@ -294,7 +294,7 @@
           <a:p>
             <a:fld id="{4A4DEA1B-11E3-46B9-B9E1-D69387743213}" type="datetimeFigureOut">
               <a:rPr lang="en-GB" smtClean="0"/>
-              <a:t>25/03/2015</a:t>
+              <a:t>04/01/2016</a:t>
             </a:fld>
             <a:endParaRPr lang="en-GB"/>
           </a:p>
@@ -464,7 +464,7 @@
           <a:p>
             <a:fld id="{4A4DEA1B-11E3-46B9-B9E1-D69387743213}" type="datetimeFigureOut">
               <a:rPr lang="en-GB" smtClean="0"/>
-              <a:t>25/03/2015</a:t>
+              <a:t>04/01/2016</a:t>
             </a:fld>
             <a:endParaRPr lang="en-GB"/>
           </a:p>
@@ -644,7 +644,7 @@
           <a:p>
             <a:fld id="{4A4DEA1B-11E3-46B9-B9E1-D69387743213}" type="datetimeFigureOut">
               <a:rPr lang="en-GB" smtClean="0"/>
-              <a:t>25/03/2015</a:t>
+              <a:t>04/01/2016</a:t>
             </a:fld>
             <a:endParaRPr lang="en-GB"/>
           </a:p>
@@ -814,7 +814,7 @@
           <a:p>
             <a:fld id="{4A4DEA1B-11E3-46B9-B9E1-D69387743213}" type="datetimeFigureOut">
               <a:rPr lang="en-GB" smtClean="0"/>
-              <a:t>25/03/2015</a:t>
+              <a:t>04/01/2016</a:t>
             </a:fld>
             <a:endParaRPr lang="en-GB"/>
           </a:p>
@@ -1060,7 +1060,7 @@
           <a:p>
             <a:fld id="{4A4DEA1B-11E3-46B9-B9E1-D69387743213}" type="datetimeFigureOut">
               <a:rPr lang="en-GB" smtClean="0"/>
-              <a:t>25/03/2015</a:t>
+              <a:t>04/01/2016</a:t>
             </a:fld>
             <a:endParaRPr lang="en-GB"/>
           </a:p>
@@ -1348,7 +1348,7 @@
           <a:p>
             <a:fld id="{4A4DEA1B-11E3-46B9-B9E1-D69387743213}" type="datetimeFigureOut">
               <a:rPr lang="en-GB" smtClean="0"/>
-              <a:t>25/03/2015</a:t>
+              <a:t>04/01/2016</a:t>
             </a:fld>
             <a:endParaRPr lang="en-GB"/>
           </a:p>
@@ -1770,7 +1770,7 @@
           <a:p>
             <a:fld id="{4A4DEA1B-11E3-46B9-B9E1-D69387743213}" type="datetimeFigureOut">
               <a:rPr lang="en-GB" smtClean="0"/>
-              <a:t>25/03/2015</a:t>
+              <a:t>04/01/2016</a:t>
             </a:fld>
             <a:endParaRPr lang="en-GB"/>
           </a:p>
@@ -1888,7 +1888,7 @@
           <a:p>
             <a:fld id="{4A4DEA1B-11E3-46B9-B9E1-D69387743213}" type="datetimeFigureOut">
               <a:rPr lang="en-GB" smtClean="0"/>
-              <a:t>25/03/2015</a:t>
+              <a:t>04/01/2016</a:t>
             </a:fld>
             <a:endParaRPr lang="en-GB"/>
           </a:p>
@@ -1983,7 +1983,7 @@
           <a:p>
             <a:fld id="{4A4DEA1B-11E3-46B9-B9E1-D69387743213}" type="datetimeFigureOut">
               <a:rPr lang="en-GB" smtClean="0"/>
-              <a:t>25/03/2015</a:t>
+              <a:t>04/01/2016</a:t>
             </a:fld>
             <a:endParaRPr lang="en-GB"/>
           </a:p>
@@ -2260,7 +2260,7 @@
           <a:p>
             <a:fld id="{4A4DEA1B-11E3-46B9-B9E1-D69387743213}" type="datetimeFigureOut">
               <a:rPr lang="en-GB" smtClean="0"/>
-              <a:t>25/03/2015</a:t>
+              <a:t>04/01/2016</a:t>
             </a:fld>
             <a:endParaRPr lang="en-GB"/>
           </a:p>
@@ -2513,7 +2513,7 @@
           <a:p>
             <a:fld id="{4A4DEA1B-11E3-46B9-B9E1-D69387743213}" type="datetimeFigureOut">
               <a:rPr lang="en-GB" smtClean="0"/>
-              <a:t>25/03/2015</a:t>
+              <a:t>04/01/2016</a:t>
             </a:fld>
             <a:endParaRPr lang="en-GB"/>
           </a:p>
@@ -2726,7 +2726,7 @@
           <a:p>
             <a:fld id="{4A4DEA1B-11E3-46B9-B9E1-D69387743213}" type="datetimeFigureOut">
               <a:rPr lang="en-GB" smtClean="0"/>
-              <a:t>25/03/2015</a:t>
+              <a:t>04/01/2016</a:t>
             </a:fld>
             <a:endParaRPr lang="en-GB"/>
           </a:p>

</xml_diff>